<commit_message>
Se termina la diapositiva
</commit_message>
<xml_diff>
--- a/ponencia_sena_obtencion_visualizacion_modelacion_AMSC/presentacion_yeiner_marco_obtencion_visualizacion_modelacion.pptx
+++ b/ponencia_sena_obtencion_visualizacion_modelacion_AMSC/presentacion_yeiner_marco_obtencion_visualizacion_modelacion.pptx
@@ -6,14 +6,12 @@
   </p:sldMasterIdLst>
   <p:sldIdLst>
     <p:sldId id="256" r:id="rId2"/>
-    <p:sldId id="257" r:id="rId3"/>
-    <p:sldId id="258" r:id="rId4"/>
-    <p:sldId id="259" r:id="rId5"/>
-    <p:sldId id="260" r:id="rId6"/>
-    <p:sldId id="261" r:id="rId7"/>
-    <p:sldId id="262" r:id="rId8"/>
-    <p:sldId id="263" r:id="rId9"/>
-    <p:sldId id="264" r:id="rId10"/>
+    <p:sldId id="258" r:id="rId3"/>
+    <p:sldId id="259" r:id="rId4"/>
+    <p:sldId id="260" r:id="rId5"/>
+    <p:sldId id="261" r:id="rId6"/>
+    <p:sldId id="263" r:id="rId7"/>
+    <p:sldId id="264" r:id="rId8"/>
   </p:sldIdLst>
   <p:sldSz cx="12192000" cy="6858000"/>
   <p:notesSz cx="6858000" cy="9144000"/>
@@ -112,6 +110,11 @@
       </a:defRPr>
     </a:lvl9pPr>
   </p:defaultTextStyle>
+  <p:extLst>
+    <p:ext uri="{EFAFB233-063F-42B5-8137-9DF3F51BA10A}">
+      <p15:sldGuideLst xmlns:p15="http://schemas.microsoft.com/office/powerpoint/2012/main"/>
+    </p:ext>
+  </p:extLst>
 </p:presentation>
 </file>
 
@@ -3539,235 +3542,105 @@
         </p:nvSpPr>
         <p:spPr>
           <a:xfrm>
-            <a:off x="589560" y="856180"/>
-            <a:ext cx="5279408" cy="1128068"/>
-          </a:xfrm>
-          <a:prstGeom prst="rect">
-            <a:avLst/>
-          </a:prstGeom>
-        </p:spPr>
-        <p:txBody>
-          <a:bodyPr vert="horz" lIns="91440" tIns="45720" rIns="91440" bIns="45720" rtlCol="0" anchor="ctr">
-            <a:noAutofit/>
+            <a:off x="617950" y="771339"/>
+            <a:ext cx="5279408" cy="1815882"/>
+          </a:xfrm>
+          <a:prstGeom prst="rect">
+            <a:avLst/>
+          </a:prstGeom>
+          <a:noFill/>
+          <a:ln w="0">
+            <a:noFill/>
+          </a:ln>
+        </p:spPr>
+        <p:style>
+          <a:lnRef idx="0">
+            <a:scrgbClr r="0" g="0" b="0"/>
+          </a:lnRef>
+          <a:fillRef idx="0">
+            <a:scrgbClr r="0" g="0" b="0"/>
+          </a:fillRef>
+          <a:effectRef idx="0">
+            <a:scrgbClr r="0" g="0" b="0"/>
+          </a:effectRef>
+          <a:fontRef idx="minor"/>
+        </p:style>
+        <p:txBody>
+          <a:bodyPr anchor="t">
+            <a:spAutoFit/>
           </a:bodyPr>
-          <a:lstStyle/>
-          <a:p>
-            <a:pPr>
+          <a:lstStyle>
+            <a:defPPr>
+              <a:defRPr lang="es-CO"/>
+            </a:defPPr>
+            <a:lvl1pPr>
               <a:lnSpc>
-                <a:spcPct val="90000"/>
+                <a:spcPct val="100000"/>
               </a:lnSpc>
-              <a:spcBef>
-                <a:spcPct val="0"/>
-              </a:spcBef>
-              <a:spcAft>
-                <a:spcPts val="600"/>
-              </a:spcAft>
-            </a:pPr>
-            <a:r>
-              <a:rPr lang="en-US" sz="2800" b="1" strike="noStrike" spc="-1" dirty="0" err="1">
-                <a:effectLst>
-                  <a:outerShdw blurRad="38100" dist="38100" dir="2700000" algn="tl">
-                    <a:srgbClr val="000000">
-                      <a:alpha val="43137"/>
-                    </a:srgbClr>
-                  </a:outerShdw>
-                </a:effectLst>
-                <a:latin typeface="+mj-lt"/>
-                <a:ea typeface="+mj-ea"/>
-                <a:cs typeface="+mj-cs"/>
-              </a:rPr>
+              <a:tabLst>
+                <a:tab pos="0" algn="l"/>
+              </a:tabLst>
+              <a:defRPr sz="5400" b="1" strike="noStrike" spc="-1">
+                <a:solidFill>
+                  <a:srgbClr val="3F3F3F"/>
+                </a:solidFill>
+                <a:latin typeface="Work Sans"/>
+                <a:ea typeface="Work Sans"/>
+              </a:defRPr>
+            </a:lvl1pPr>
+          </a:lstStyle>
+          <a:p>
+            <a:r>
+              <a:rPr lang="en-US" sz="2800" dirty="0" err="1"/>
               <a:t>Obtención</a:t>
             </a:r>
             <a:r>
-              <a:rPr lang="en-US" sz="2800" b="1" strike="noStrike" spc="-1" dirty="0">
-                <a:effectLst>
-                  <a:outerShdw blurRad="38100" dist="38100" dir="2700000" algn="tl">
-                    <a:srgbClr val="000000">
-                      <a:alpha val="43137"/>
-                    </a:srgbClr>
-                  </a:outerShdw>
-                </a:effectLst>
-                <a:latin typeface="+mj-lt"/>
-                <a:ea typeface="+mj-ea"/>
-                <a:cs typeface="+mj-cs"/>
-              </a:rPr>
+              <a:rPr lang="en-US" sz="2800" dirty="0"/>
               <a:t>, </a:t>
             </a:r>
             <a:r>
-              <a:rPr lang="en-US" sz="2800" b="1" strike="noStrike" spc="-1" dirty="0" err="1">
-                <a:effectLst>
-                  <a:outerShdw blurRad="38100" dist="38100" dir="2700000" algn="tl">
-                    <a:srgbClr val="000000">
-                      <a:alpha val="43137"/>
-                    </a:srgbClr>
-                  </a:outerShdw>
-                </a:effectLst>
-                <a:latin typeface="+mj-lt"/>
-                <a:ea typeface="+mj-ea"/>
-                <a:cs typeface="+mj-cs"/>
-              </a:rPr>
+              <a:rPr lang="en-US" sz="2800" dirty="0" err="1"/>
               <a:t>visualización</a:t>
             </a:r>
             <a:r>
-              <a:rPr lang="en-US" sz="2800" b="1" strike="noStrike" spc="-1" dirty="0">
-                <a:effectLst>
-                  <a:outerShdw blurRad="38100" dist="38100" dir="2700000" algn="tl">
-                    <a:srgbClr val="000000">
-                      <a:alpha val="43137"/>
-                    </a:srgbClr>
-                  </a:outerShdw>
-                </a:effectLst>
-                <a:latin typeface="+mj-lt"/>
-                <a:ea typeface="+mj-ea"/>
-                <a:cs typeface="+mj-cs"/>
-              </a:rPr>
+              <a:rPr lang="en-US" sz="2800" dirty="0"/>
               <a:t> y </a:t>
             </a:r>
             <a:r>
-              <a:rPr lang="en-US" sz="2800" b="1" strike="noStrike" spc="-1" dirty="0" err="1">
-                <a:effectLst>
-                  <a:outerShdw blurRad="38100" dist="38100" dir="2700000" algn="tl">
-                    <a:srgbClr val="000000">
-                      <a:alpha val="43137"/>
-                    </a:srgbClr>
-                  </a:outerShdw>
-                </a:effectLst>
-                <a:latin typeface="+mj-lt"/>
-                <a:ea typeface="+mj-ea"/>
-                <a:cs typeface="+mj-cs"/>
-              </a:rPr>
+              <a:rPr lang="en-US" sz="2800" dirty="0" err="1"/>
               <a:t>modelación</a:t>
             </a:r>
             <a:r>
-              <a:rPr lang="en-US" sz="2800" b="1" strike="noStrike" spc="-1" dirty="0">
-                <a:effectLst>
-                  <a:outerShdw blurRad="38100" dist="38100" dir="2700000" algn="tl">
-                    <a:srgbClr val="000000">
-                      <a:alpha val="43137"/>
-                    </a:srgbClr>
-                  </a:outerShdw>
-                </a:effectLst>
-                <a:latin typeface="+mj-lt"/>
-                <a:ea typeface="+mj-ea"/>
-                <a:cs typeface="+mj-cs"/>
-              </a:rPr>
+              <a:rPr lang="en-US" sz="2800" dirty="0"/>
               <a:t> de </a:t>
             </a:r>
             <a:r>
-              <a:rPr lang="en-US" sz="2800" b="1" strike="noStrike" spc="-1" dirty="0" err="1">
-                <a:effectLst>
-                  <a:outerShdw blurRad="38100" dist="38100" dir="2700000" algn="tl">
-                    <a:srgbClr val="000000">
-                      <a:alpha val="43137"/>
-                    </a:srgbClr>
-                  </a:outerShdw>
-                </a:effectLst>
-                <a:latin typeface="+mj-lt"/>
-                <a:ea typeface="+mj-ea"/>
-                <a:cs typeface="+mj-cs"/>
-              </a:rPr>
+              <a:rPr lang="en-US" sz="2800" dirty="0" err="1"/>
               <a:t>datos</a:t>
             </a:r>
             <a:r>
-              <a:rPr lang="en-US" sz="2800" b="1" strike="noStrike" spc="-1" dirty="0">
-                <a:effectLst>
-                  <a:outerShdw blurRad="38100" dist="38100" dir="2700000" algn="tl">
-                    <a:srgbClr val="000000">
-                      <a:alpha val="43137"/>
-                    </a:srgbClr>
-                  </a:outerShdw>
-                </a:effectLst>
-                <a:latin typeface="+mj-lt"/>
-                <a:ea typeface="+mj-ea"/>
-                <a:cs typeface="+mj-cs"/>
-              </a:rPr>
+              <a:rPr lang="en-US" sz="2800" dirty="0"/>
               <a:t> del </a:t>
             </a:r>
             <a:r>
-              <a:rPr lang="en-US" sz="2800" b="1" strike="noStrike" spc="-1" dirty="0" err="1">
-                <a:effectLst>
-                  <a:outerShdw blurRad="38100" dist="38100" dir="2700000" algn="tl">
-                    <a:srgbClr val="000000">
-                      <a:alpha val="43137"/>
-                    </a:srgbClr>
-                  </a:outerShdw>
-                </a:effectLst>
-                <a:latin typeface="+mj-lt"/>
-                <a:ea typeface="+mj-ea"/>
-                <a:cs typeface="+mj-cs"/>
-              </a:rPr>
+              <a:rPr lang="en-US" sz="2800" dirty="0" err="1"/>
               <a:t>proyecto</a:t>
             </a:r>
             <a:r>
-              <a:rPr lang="en-US" sz="2800" b="1" strike="noStrike" spc="-1" dirty="0">
-                <a:effectLst>
-                  <a:outerShdw blurRad="38100" dist="38100" dir="2700000" algn="tl">
-                    <a:srgbClr val="000000">
-                      <a:alpha val="43137"/>
-                    </a:srgbClr>
-                  </a:outerShdw>
-                </a:effectLst>
-                <a:latin typeface="+mj-lt"/>
-                <a:ea typeface="+mj-ea"/>
-                <a:cs typeface="+mj-cs"/>
-              </a:rPr>
+              <a:rPr lang="en-US" sz="2800" dirty="0"/>
               <a:t> </a:t>
             </a:r>
             <a:r>
-              <a:rPr lang="en-US" sz="2800" b="1" strike="noStrike" spc="-1" dirty="0" err="1">
-                <a:effectLst>
-                  <a:outerShdw blurRad="38100" dist="38100" dir="2700000" algn="tl">
-                    <a:srgbClr val="000000">
-                      <a:alpha val="43137"/>
-                    </a:srgbClr>
-                  </a:outerShdw>
-                </a:effectLst>
-                <a:latin typeface="+mj-lt"/>
-                <a:ea typeface="+mj-ea"/>
-                <a:cs typeface="+mj-cs"/>
-              </a:rPr>
+              <a:rPr lang="en-US" sz="2800" dirty="0" err="1"/>
               <a:t>investigativo</a:t>
             </a:r>
             <a:r>
-              <a:rPr lang="en-US" sz="2800" b="1" strike="noStrike" spc="-1" dirty="0">
-                <a:effectLst>
-                  <a:outerShdw blurRad="38100" dist="38100" dir="2700000" algn="tl">
-                    <a:srgbClr val="000000">
-                      <a:alpha val="43137"/>
-                    </a:srgbClr>
-                  </a:outerShdw>
-                </a:effectLst>
-                <a:latin typeface="+mj-lt"/>
-                <a:ea typeface="+mj-ea"/>
-                <a:cs typeface="+mj-cs"/>
-              </a:rPr>
+              <a:rPr lang="en-US" sz="2800" dirty="0"/>
               <a:t> AMSC</a:t>
             </a:r>
           </a:p>
           <a:p>
-            <a:pPr>
-              <a:lnSpc>
-                <a:spcPct val="90000"/>
-              </a:lnSpc>
-              <a:spcBef>
-                <a:spcPct val="0"/>
-              </a:spcBef>
-              <a:spcAft>
-                <a:spcPts val="600"/>
-              </a:spcAft>
-            </a:pPr>
-            <a:endParaRPr lang="en-US" sz="2800" b="1" dirty="0">
-              <a:effectLst>
-                <a:outerShdw blurRad="38100" dist="38100" dir="2700000" algn="tl">
-                  <a:srgbClr val="000000">
-                    <a:alpha val="43137"/>
-                  </a:srgbClr>
-                </a:outerShdw>
-              </a:effectLst>
-              <a:latin typeface="+mj-lt"/>
-              <a:ea typeface="+mj-ea"/>
-              <a:cs typeface="+mj-cs"/>
-            </a:endParaRPr>
+            <a:endParaRPr lang="en-US" sz="2800" dirty="0"/>
           </a:p>
         </p:txBody>
       </p:sp>
@@ -4439,14 +4312,14 @@
       </p:grpSpPr>
       <p:sp>
         <p:nvSpPr>
-          <p:cNvPr id="42" name="Google Shape;98;p2"/>
+          <p:cNvPr id="44" name="Google Shape;104;p3"/>
           <p:cNvSpPr/>
           <p:nvPr/>
         </p:nvSpPr>
         <p:spPr>
           <a:xfrm>
-            <a:off x="995400" y="2551680"/>
-            <a:ext cx="6453360" cy="1737000"/>
+            <a:off x="3913920" y="463320"/>
+            <a:ext cx="4050720" cy="1919880"/>
           </a:xfrm>
           <a:prstGeom prst="rect">
             <a:avLst/>
@@ -4474,7 +4347,7 @@
           </a:bodyPr>
           <a:lstStyle/>
           <a:p>
-            <a:pPr>
+            <a:pPr algn="ctr">
               <a:lnSpc>
                 <a:spcPct val="100000"/>
               </a:lnSpc>
@@ -4483,118 +4356,56 @@
               </a:tabLst>
             </a:pPr>
             <a:r>
-              <a:rPr lang="es-CO" sz="5400" b="1" strike="noStrike" spc="-1">
+              <a:rPr lang="es-CO" sz="6000" b="1" strike="noStrike" spc="-1">
                 <a:solidFill>
-                  <a:srgbClr val="3F3F3F"/>
+                  <a:srgbClr val="4D4D4C"/>
                 </a:solidFill>
                 <a:latin typeface="Work Sans"/>
                 <a:ea typeface="Work Sans"/>
               </a:rPr>
-              <a:t>Título</a:t>
-            </a:r>
-            <a:endParaRPr lang="es-CO" sz="5400" b="0" strike="noStrike" spc="-1">
+              <a:t>Resumen</a:t>
+            </a:r>
+            <a:endParaRPr lang="es-CO" sz="6000" b="0" strike="noStrike" spc="-1">
               <a:solidFill>
                 <a:srgbClr val="000000"/>
               </a:solidFill>
               <a:latin typeface="Arial"/>
             </a:endParaRPr>
           </a:p>
-          <a:p>
-            <a:pPr>
-              <a:lnSpc>
-                <a:spcPct val="100000"/>
-              </a:lnSpc>
-              <a:tabLst>
-                <a:tab pos="0" algn="l"/>
-              </a:tabLst>
-            </a:pPr>
-            <a:r>
-              <a:rPr lang="es-CO" sz="5400" b="1" strike="noStrike" spc="-1">
-                <a:solidFill>
-                  <a:srgbClr val="3F3F3F"/>
-                </a:solidFill>
-                <a:latin typeface="Work Sans"/>
-                <a:ea typeface="Work Sans"/>
-              </a:rPr>
-              <a:t>presentación</a:t>
-            </a:r>
-            <a:endParaRPr lang="es-CO" sz="5400" b="0" strike="noStrike" spc="-1">
-              <a:solidFill>
-                <a:srgbClr val="000000"/>
-              </a:solidFill>
-              <a:latin typeface="Arial"/>
-            </a:endParaRPr>
-          </a:p>
-        </p:txBody>
-      </p:sp>
-      <p:pic>
-        <p:nvPicPr>
-          <p:cNvPr id="43" name="Google Shape;99;p2" descr="Imagen que contiene Diagrama&#10;&#10;Descripción generada automáticamente"/>
-          <p:cNvPicPr/>
+        </p:txBody>
+      </p:sp>
+      <p:cxnSp>
+        <p:nvCxnSpPr>
+          <p:cNvPr id="45" name="Google Shape;105;p3"/>
+          <p:cNvCxnSpPr/>
           <p:nvPr/>
-        </p:nvPicPr>
-        <p:blipFill>
-          <a:blip r:embed="rId3"/>
-          <a:srcRect t="16091" b="26995"/>
-          <a:stretch/>
-        </p:blipFill>
-        <p:spPr>
-          <a:xfrm>
-            <a:off x="9329040" y="4559040"/>
-            <a:ext cx="2145240" cy="1220760"/>
-          </a:xfrm>
-          <a:prstGeom prst="rect">
-            <a:avLst/>
-          </a:prstGeom>
-          <a:ln w="0">
-            <a:noFill/>
+        </p:nvCxnSpPr>
+        <p:spPr>
+          <a:xfrm>
+            <a:off x="4914000" y="1479240"/>
+            <a:ext cx="2247840" cy="360"/>
+          </a:xfrm>
+          <a:prstGeom prst="straightConnector1">
+            <a:avLst/>
+          </a:prstGeom>
+          <a:ln w="12700">
+            <a:solidFill>
+              <a:srgbClr val="38AA00"/>
+            </a:solidFill>
+            <a:miter/>
           </a:ln>
         </p:spPr>
-      </p:pic>
-    </p:spTree>
-  </p:cSld>
-  <p:clrMapOvr>
-    <a:masterClrMapping/>
-  </p:clrMapOvr>
-</p:sld>
-</file>
-
-<file path=ppt/slides/slide3.xml><?xml version="1.0" encoding="utf-8"?>
-<p:sld xmlns:a="http://schemas.openxmlformats.org/drawingml/2006/main" xmlns:r="http://schemas.openxmlformats.org/officeDocument/2006/relationships" xmlns:p="http://schemas.openxmlformats.org/presentationml/2006/main">
-  <p:cSld>
-    <p:bg>
-      <p:bgPr>
-        <a:blipFill rotWithShape="0">
-          <a:blip r:embed="rId2"/>
-          <a:stretch/>
-        </a:blipFill>
-        <a:effectLst/>
-      </p:bgPr>
-    </p:bg>
-    <p:spTree>
-      <p:nvGrpSpPr>
-        <p:cNvPr id="1" name=""/>
-        <p:cNvGrpSpPr/>
-        <p:nvPr/>
-      </p:nvGrpSpPr>
-      <p:grpSpPr>
-        <a:xfrm>
-          <a:off x="0" y="0"/>
-          <a:ext cx="0" cy="0"/>
-          <a:chOff x="0" y="0"/>
-          <a:chExt cx="0" cy="0"/>
-        </a:xfrm>
-      </p:grpSpPr>
-      <p:sp>
-        <p:nvSpPr>
-          <p:cNvPr id="44" name="Google Shape;104;p3"/>
+      </p:cxnSp>
+      <p:sp>
+        <p:nvSpPr>
+          <p:cNvPr id="46" name="Google Shape;106;p3"/>
           <p:cNvSpPr/>
           <p:nvPr/>
         </p:nvSpPr>
         <p:spPr>
           <a:xfrm>
-            <a:off x="3913920" y="463320"/>
-            <a:ext cx="4050720" cy="1919880"/>
+            <a:off x="2595078" y="1816523"/>
+            <a:ext cx="7001843" cy="830997"/>
           </a:xfrm>
           <a:prstGeom prst="rect">
             <a:avLst/>
@@ -4622,145 +4433,70 @@
           </a:bodyPr>
           <a:lstStyle/>
           <a:p>
-            <a:pPr algn="ctr">
+            <a:pPr>
               <a:lnSpc>
-                <a:spcPct val="100000"/>
+                <a:spcPct val="150000"/>
               </a:lnSpc>
+              <a:spcBef>
+                <a:spcPts val="1199"/>
+              </a:spcBef>
               <a:tabLst>
                 <a:tab pos="0" algn="l"/>
               </a:tabLst>
             </a:pPr>
             <a:r>
-              <a:rPr lang="es-CO" sz="6000" b="1" strike="noStrike" spc="-1">
+              <a:rPr lang="es-MX" sz="1600" spc="-1" dirty="0">
                 <a:solidFill>
-                  <a:srgbClr val="4D4D4C"/>
-                </a:solidFill>
-                <a:latin typeface="Work Sans"/>
-                <a:ea typeface="Work Sans"/>
-              </a:rPr>
-              <a:t>Resumen</a:t>
-            </a:r>
-            <a:endParaRPr lang="es-CO" sz="6000" b="0" strike="noStrike" spc="-1">
-              <a:solidFill>
-                <a:srgbClr val="000000"/>
-              </a:solidFill>
-              <a:latin typeface="Arial"/>
-            </a:endParaRPr>
-          </a:p>
-        </p:txBody>
-      </p:sp>
-      <p:cxnSp>
-        <p:nvCxnSpPr>
-          <p:cNvPr id="45" name="Google Shape;105;p3"/>
-          <p:cNvCxnSpPr/>
-          <p:nvPr/>
-        </p:nvCxnSpPr>
-        <p:spPr>
-          <a:xfrm>
-            <a:off x="4914000" y="1479240"/>
-            <a:ext cx="2247840" cy="360"/>
-          </a:xfrm>
-          <a:prstGeom prst="straightConnector1">
-            <a:avLst/>
-          </a:prstGeom>
-          <a:ln w="12700">
-            <a:solidFill>
-              <a:srgbClr val="38AA00"/>
-            </a:solidFill>
-            <a:miter/>
-          </a:ln>
-        </p:spPr>
-      </p:cxnSp>
-      <p:sp>
-        <p:nvSpPr>
-          <p:cNvPr id="46" name="Google Shape;106;p3"/>
-          <p:cNvSpPr/>
-          <p:nvPr/>
-        </p:nvSpPr>
-        <p:spPr>
-          <a:xfrm>
-            <a:off x="4110840" y="1618560"/>
-            <a:ext cx="3854160" cy="578520"/>
-          </a:xfrm>
-          <a:prstGeom prst="rect">
-            <a:avLst/>
-          </a:prstGeom>
-          <a:noFill/>
-          <a:ln w="0">
-            <a:noFill/>
-          </a:ln>
-        </p:spPr>
-        <p:style>
-          <a:lnRef idx="0">
-            <a:scrgbClr r="0" g="0" b="0"/>
-          </a:lnRef>
-          <a:fillRef idx="0">
-            <a:scrgbClr r="0" g="0" b="0"/>
-          </a:fillRef>
-          <a:effectRef idx="0">
-            <a:scrgbClr r="0" g="0" b="0"/>
-          </a:effectRef>
-          <a:fontRef idx="minor"/>
-        </p:style>
-        <p:txBody>
-          <a:bodyPr anchor="t">
-            <a:spAutoFit/>
-          </a:bodyPr>
-          <a:lstStyle/>
-          <a:p>
-            <a:pPr algn="ctr">
-              <a:lnSpc>
-                <a:spcPct val="100000"/>
-              </a:lnSpc>
-              <a:tabLst>
-                <a:tab pos="0" algn="l"/>
-              </a:tabLst>
-            </a:pPr>
-            <a:r>
-              <a:rPr lang="es-CO" sz="1600" b="0" strike="noStrike" spc="-1" dirty="0">
-                <a:solidFill>
-                  <a:srgbClr val="000000"/>
+                  <a:schemeClr val="dk1"/>
                 </a:solidFill>
                 <a:latin typeface="Work Sans Light"/>
-                <a:ea typeface="Work Sans Light"/>
               </a:rPr>
-              <a:t>texto corto descriptivo</a:t>
-            </a:r>
-            <a:endParaRPr lang="es-CO" sz="1600" b="0" strike="noStrike" spc="-1" dirty="0">
+              <a:t>A través del uso de estaciones de monitoreo permanente, imágenes satelitales y modelos teóricos computacionales, estudiaremos el comportamiento de la atmósfera sobre el Departamento de Antioquia.</a:t>
+            </a:r>
+            <a:endParaRPr lang="es-CO" sz="1600" spc="-1" dirty="0">
               <a:solidFill>
-                <a:srgbClr val="000000"/>
+                <a:schemeClr val="dk1"/>
               </a:solidFill>
-              <a:latin typeface="Arial"/>
+              <a:latin typeface="Work Sans Light"/>
             </a:endParaRPr>
           </a:p>
-          <a:p>
-            <a:pPr algn="ctr">
-              <a:lnSpc>
-                <a:spcPct val="100000"/>
-              </a:lnSpc>
-              <a:tabLst>
-                <a:tab pos="0" algn="l"/>
-              </a:tabLst>
-            </a:pPr>
-            <a:r>
-              <a:rPr lang="es-CO" sz="1600" b="0" strike="noStrike" spc="-1" dirty="0">
-                <a:solidFill>
-                  <a:srgbClr val="000000"/>
-                </a:solidFill>
-                <a:latin typeface="Work Sans Light"/>
-                <a:ea typeface="Work Sans Light"/>
-              </a:rPr>
-              <a:t>a 2 o 3 líneas</a:t>
-            </a:r>
-            <a:endParaRPr lang="es-CO" sz="1600" b="0" strike="noStrike" spc="-1" dirty="0">
-              <a:solidFill>
-                <a:srgbClr val="000000"/>
-              </a:solidFill>
-              <a:latin typeface="Arial"/>
-            </a:endParaRPr>
-          </a:p>
-        </p:txBody>
-      </p:sp>
+        </p:txBody>
+      </p:sp>
+      <p:pic>
+        <p:nvPicPr>
+          <p:cNvPr id="2" name="Imagen 1" descr="Un grupo de personas de pie&#10;&#10;Descripción generada automáticamente">
+            <a:extLst>
+              <a:ext uri="{FF2B5EF4-FFF2-40B4-BE49-F238E27FC236}">
+                <a16:creationId xmlns:a16="http://schemas.microsoft.com/office/drawing/2014/main" id="{40C489FB-56C7-FFAB-FAB1-84A3A1B926E3}"/>
+              </a:ext>
+            </a:extLst>
+          </p:cNvPr>
+          <p:cNvPicPr>
+            <a:picLocks noChangeAspect="1"/>
+          </p:cNvPicPr>
+          <p:nvPr/>
+        </p:nvPicPr>
+        <p:blipFill rotWithShape="1">
+          <a:blip r:embed="rId3" cstate="print">
+            <a:extLst>
+              <a:ext uri="{28A0092B-C50C-407E-A947-70E740481C1C}">
+                <a14:useLocalDpi xmlns:a14="http://schemas.microsoft.com/office/drawing/2010/main" val="0"/>
+              </a:ext>
+            </a:extLst>
+          </a:blip>
+          <a:srcRect t="21570" b="19545"/>
+          <a:stretch/>
+        </p:blipFill>
+        <p:spPr>
+          <a:xfrm>
+            <a:off x="4417452" y="3399120"/>
+            <a:ext cx="3805555" cy="2987863"/>
+          </a:xfrm>
+          <a:prstGeom prst="rect">
+            <a:avLst/>
+          </a:prstGeom>
+        </p:spPr>
+      </p:pic>
     </p:spTree>
   </p:cSld>
   <p:clrMapOvr>
@@ -4769,7 +4505,7 @@
 </p:sld>
 </file>
 
-<file path=ppt/slides/slide4.xml><?xml version="1.0" encoding="utf-8"?>
+<file path=ppt/slides/slide3.xml><?xml version="1.0" encoding="utf-8"?>
 <p:sld xmlns:a="http://schemas.openxmlformats.org/drawingml/2006/main" xmlns:r="http://schemas.openxmlformats.org/officeDocument/2006/relationships" xmlns:p="http://schemas.openxmlformats.org/presentationml/2006/main">
   <p:cSld>
     <p:bg>
@@ -4902,7 +4638,7 @@
               </a:tabLst>
             </a:pPr>
             <a:r>
-              <a:rPr lang="en-US" sz="4000" b="1" strike="noStrike" kern="1200" spc="-1">
+              <a:rPr lang="en-US" sz="4000" b="1" strike="noStrike" kern="1200" spc="-1" dirty="0" err="1">
                 <a:solidFill>
                   <a:schemeClr val="tx1"/>
                 </a:solidFill>
@@ -4912,7 +4648,7 @@
               </a:rPr>
               <a:t>Introducción</a:t>
             </a:r>
-            <a:endParaRPr lang="en-US" sz="4000" b="0" strike="noStrike" kern="1200" spc="-1">
+            <a:endParaRPr lang="en-US" sz="4000" b="0" strike="noStrike" kern="1200" spc="-1" dirty="0">
               <a:solidFill>
                 <a:schemeClr val="tx1"/>
               </a:solidFill>
@@ -5173,210 +4909,13 @@
           </a:bodyPr>
           <a:lstStyle/>
           <a:p>
-            <a:pPr indent="-228600">
+            <a:pPr marL="228600">
               <a:lnSpc>
                 <a:spcPct val="90000"/>
               </a:lnSpc>
               <a:spcBef>
                 <a:spcPts val="1199"/>
               </a:spcBef>
-              <a:buFont typeface="Arial" panose="020B0604020202020204" pitchFamily="34" charset="0"/>
-              <a:buChar char="•"/>
-              <a:tabLst>
-                <a:tab pos="0" algn="l"/>
-              </a:tabLst>
-            </a:pPr>
-            <a:r>
-              <a:rPr lang="en-US" sz="2000" b="0" strike="noStrike" spc="-1" dirty="0"/>
-              <a:t>En </a:t>
-            </a:r>
-            <a:r>
-              <a:rPr lang="en-US" sz="2000" b="0" strike="noStrike" spc="-1" dirty="0" err="1"/>
-              <a:t>este</a:t>
-            </a:r>
-            <a:r>
-              <a:rPr lang="en-US" sz="2000" b="0" strike="noStrike" spc="-1" dirty="0"/>
-              <a:t> </a:t>
-            </a:r>
-            <a:r>
-              <a:rPr lang="en-US" sz="2000" b="0" strike="noStrike" spc="-1" dirty="0" err="1"/>
-              <a:t>apartado</a:t>
-            </a:r>
-            <a:r>
-              <a:rPr lang="en-US" sz="2000" b="0" strike="noStrike" spc="-1" dirty="0"/>
-              <a:t> se </a:t>
-            </a:r>
-            <a:r>
-              <a:rPr lang="en-US" sz="2000" b="0" strike="noStrike" spc="-1" dirty="0" err="1"/>
-              <a:t>debe</a:t>
-            </a:r>
-            <a:r>
-              <a:rPr lang="en-US" sz="2000" b="0" strike="noStrike" spc="-1" dirty="0"/>
-              <a:t> </a:t>
-            </a:r>
-            <a:r>
-              <a:rPr lang="en-US" sz="2000" b="0" strike="noStrike" spc="-1" dirty="0" err="1"/>
-              <a:t>desarrollar</a:t>
-            </a:r>
-            <a:r>
-              <a:rPr lang="en-US" sz="2000" b="0" strike="noStrike" spc="-1" dirty="0"/>
-              <a:t> </a:t>
-            </a:r>
-            <a:r>
-              <a:rPr lang="en-US" sz="2000" b="0" strike="noStrike" spc="-1" dirty="0" err="1"/>
-              <a:t>el</a:t>
-            </a:r>
-            <a:r>
-              <a:rPr lang="en-US" sz="2000" b="0" strike="noStrike" spc="-1" dirty="0"/>
-              <a:t> </a:t>
-            </a:r>
-            <a:r>
-              <a:rPr lang="en-US" sz="2000" b="0" strike="noStrike" spc="-1" dirty="0" err="1"/>
-              <a:t>acercamiento</a:t>
-            </a:r>
-            <a:r>
-              <a:rPr lang="en-US" sz="2000" b="0" strike="noStrike" spc="-1" dirty="0"/>
-              <a:t> a la </a:t>
-            </a:r>
-            <a:r>
-              <a:rPr lang="en-US" sz="2000" b="0" strike="noStrike" spc="-1" dirty="0" err="1"/>
-              <a:t>problemática</a:t>
-            </a:r>
-            <a:r>
-              <a:rPr lang="en-US" sz="2000" b="0" strike="noStrike" spc="-1" dirty="0"/>
-              <a:t>, </a:t>
-            </a:r>
-            <a:r>
-              <a:rPr lang="en-US" sz="2000" b="0" strike="noStrike" spc="-1" dirty="0" err="1"/>
-              <a:t>objeto</a:t>
-            </a:r>
-            <a:r>
-              <a:rPr lang="en-US" sz="2000" b="0" strike="noStrike" spc="-1" dirty="0"/>
-              <a:t> de </a:t>
-            </a:r>
-            <a:r>
-              <a:rPr lang="en-US" sz="2000" b="0" strike="noStrike" spc="-1" dirty="0" err="1"/>
-              <a:t>estudio</a:t>
-            </a:r>
-            <a:r>
-              <a:rPr lang="en-US" sz="2000" b="0" strike="noStrike" spc="-1" dirty="0"/>
-              <a:t> </a:t>
-            </a:r>
-            <a:r>
-              <a:rPr lang="en-US" sz="2000" b="0" strike="noStrike" spc="-1" dirty="0" err="1"/>
-              <a:t>desde</a:t>
-            </a:r>
-            <a:r>
-              <a:rPr lang="en-US" sz="2000" b="0" strike="noStrike" spc="-1" dirty="0"/>
-              <a:t> </a:t>
-            </a:r>
-            <a:r>
-              <a:rPr lang="en-US" sz="2000" b="0" strike="noStrike" spc="-1" dirty="0" err="1"/>
-              <a:t>su</a:t>
-            </a:r>
-            <a:r>
-              <a:rPr lang="en-US" sz="2000" b="0" strike="noStrike" spc="-1" dirty="0"/>
-              <a:t> </a:t>
-            </a:r>
-            <a:r>
-              <a:rPr lang="en-US" sz="2000" b="0" strike="noStrike" spc="-1" dirty="0" err="1"/>
-              <a:t>importancia</a:t>
-            </a:r>
-            <a:r>
-              <a:rPr lang="en-US" sz="2000" b="0" strike="noStrike" spc="-1" dirty="0"/>
-              <a:t> y </a:t>
-            </a:r>
-            <a:r>
-              <a:rPr lang="en-US" sz="2000" b="0" strike="noStrike" spc="-1" dirty="0" err="1"/>
-              <a:t>relevancia</a:t>
-            </a:r>
-            <a:r>
-              <a:rPr lang="en-US" sz="2000" b="0" strike="noStrike" spc="-1" dirty="0"/>
-              <a:t>, de forma que se </a:t>
-            </a:r>
-            <a:r>
-              <a:rPr lang="en-US" sz="2000" b="0" strike="noStrike" spc="-1" dirty="0" err="1"/>
-              <a:t>plantee</a:t>
-            </a:r>
-            <a:r>
-              <a:rPr lang="en-US" sz="2000" b="0" strike="noStrike" spc="-1" dirty="0"/>
-              <a:t> la </a:t>
-            </a:r>
-            <a:r>
-              <a:rPr lang="en-US" sz="2000" b="0" strike="noStrike" spc="-1" dirty="0" err="1"/>
-              <a:t>pregunta</a:t>
-            </a:r>
-            <a:r>
-              <a:rPr lang="en-US" sz="2000" b="0" strike="noStrike" spc="-1" dirty="0"/>
-              <a:t> y </a:t>
-            </a:r>
-            <a:r>
-              <a:rPr lang="en-US" sz="2000" b="0" strike="noStrike" spc="-1" dirty="0" err="1"/>
-              <a:t>objeto</a:t>
-            </a:r>
-            <a:r>
-              <a:rPr lang="en-US" sz="2000" b="0" strike="noStrike" spc="-1" dirty="0"/>
-              <a:t> de </a:t>
-            </a:r>
-            <a:r>
-              <a:rPr lang="en-US" sz="2000" b="0" strike="noStrike" spc="-1" dirty="0" err="1"/>
-              <a:t>investigación</a:t>
-            </a:r>
-            <a:r>
-              <a:rPr lang="en-US" sz="2000" b="0" strike="noStrike" spc="-1" dirty="0"/>
-              <a:t> (</a:t>
-            </a:r>
-            <a:r>
-              <a:rPr lang="en-US" sz="2000" b="0" strike="noStrike" spc="-1" dirty="0" err="1"/>
-              <a:t>debe</a:t>
-            </a:r>
-            <a:r>
-              <a:rPr lang="en-US" sz="2000" b="0" strike="noStrike" spc="-1" dirty="0"/>
-              <a:t> </a:t>
-            </a:r>
-            <a:r>
-              <a:rPr lang="en-US" sz="2000" b="0" strike="noStrike" spc="-1" dirty="0" err="1"/>
-              <a:t>estar</a:t>
-            </a:r>
-            <a:r>
-              <a:rPr lang="en-US" sz="2000" b="0" strike="noStrike" spc="-1" dirty="0"/>
-              <a:t> </a:t>
-            </a:r>
-            <a:r>
-              <a:rPr lang="en-US" sz="2000" b="0" strike="noStrike" spc="-1" dirty="0" err="1"/>
-              <a:t>soportado</a:t>
-            </a:r>
-            <a:r>
-              <a:rPr lang="en-US" sz="2000" b="0" strike="noStrike" spc="-1" dirty="0"/>
-              <a:t> </a:t>
-            </a:r>
-            <a:r>
-              <a:rPr lang="en-US" sz="2000" b="0" strike="noStrike" spc="-1" dirty="0" err="1"/>
-              <a:t>en</a:t>
-            </a:r>
-            <a:r>
-              <a:rPr lang="en-US" sz="2000" b="0" strike="noStrike" spc="-1" dirty="0"/>
-              <a:t> </a:t>
-            </a:r>
-            <a:r>
-              <a:rPr lang="en-US" sz="2000" b="0" strike="noStrike" spc="-1" dirty="0" err="1"/>
-              <a:t>referentes</a:t>
-            </a:r>
-            <a:r>
-              <a:rPr lang="en-US" sz="2000" b="0" strike="noStrike" spc="-1" dirty="0"/>
-              <a:t>).</a:t>
-            </a:r>
-          </a:p>
-          <a:p>
-            <a:pPr marL="457200" indent="-228600">
-              <a:lnSpc>
-                <a:spcPct val="90000"/>
-              </a:lnSpc>
-              <a:spcBef>
-                <a:spcPts val="1199"/>
-              </a:spcBef>
-              <a:buFont typeface="Arial" panose="020B0604020202020204" pitchFamily="34" charset="0"/>
-              <a:buChar char="•"/>
               <a:tabLst>
                 <a:tab pos="0" algn="l"/>
               </a:tabLst>
@@ -5680,6 +5219,449 @@
           </a:ln>
         </p:spPr>
       </p:cxnSp>
+      <p:sp>
+        <p:nvSpPr>
+          <p:cNvPr id="8" name="Google Shape;120;p6">
+            <a:extLst>
+              <a:ext uri="{FF2B5EF4-FFF2-40B4-BE49-F238E27FC236}">
+                <a16:creationId xmlns:a16="http://schemas.microsoft.com/office/drawing/2014/main" id="{5016EEFE-F83E-150E-7567-C99ABA5F3BAF}"/>
+              </a:ext>
+            </a:extLst>
+          </p:cNvPr>
+          <p:cNvSpPr/>
+          <p:nvPr/>
+        </p:nvSpPr>
+        <p:spPr>
+          <a:xfrm>
+            <a:off x="295015" y="2184308"/>
+            <a:ext cx="6057848" cy="1896801"/>
+          </a:xfrm>
+          <a:prstGeom prst="rect">
+            <a:avLst/>
+          </a:prstGeom>
+          <a:noFill/>
+          <a:ln w="0">
+            <a:noFill/>
+          </a:ln>
+        </p:spPr>
+        <p:style>
+          <a:lnRef idx="0">
+            <a:scrgbClr r="0" g="0" b="0"/>
+          </a:lnRef>
+          <a:fillRef idx="0">
+            <a:scrgbClr r="0" g="0" b="0"/>
+          </a:fillRef>
+          <a:effectRef idx="0">
+            <a:scrgbClr r="0" g="0" b="0"/>
+          </a:effectRef>
+          <a:fontRef idx="minor"/>
+        </p:style>
+        <p:txBody>
+          <a:bodyPr wrap="square" anchor="t">
+            <a:spAutoFit/>
+          </a:bodyPr>
+          <a:lstStyle/>
+          <a:p>
+            <a:pPr algn="just">
+              <a:lnSpc>
+                <a:spcPct val="150000"/>
+              </a:lnSpc>
+              <a:spcBef>
+                <a:spcPts val="1199"/>
+              </a:spcBef>
+              <a:tabLst>
+                <a:tab pos="0" algn="l"/>
+              </a:tabLst>
+            </a:pPr>
+            <a:r>
+              <a:rPr lang="es-MX" sz="1600" b="0" strike="noStrike" spc="-1" dirty="0">
+                <a:solidFill>
+                  <a:schemeClr val="dk1"/>
+                </a:solidFill>
+                <a:latin typeface="Work Sans Light"/>
+                <a:ea typeface="Work Sans Light"/>
+              </a:rPr>
+              <a:t>En este trabajo, se analizan datos meteorológicos, centrándose en variables como temperatura, presión atmosférica y humedad relativa. Se lleva a cabo un análisis completo que incluye la obtención, visualización, limpieza y clasificación de los datos. </a:t>
+            </a:r>
+            <a:endParaRPr lang="es-CO" sz="1600" b="0" strike="noStrike" spc="-1" dirty="0">
+              <a:solidFill>
+                <a:srgbClr val="000000"/>
+              </a:solidFill>
+              <a:latin typeface="Arial"/>
+            </a:endParaRPr>
+          </a:p>
+        </p:txBody>
+      </p:sp>
+    </p:spTree>
+  </p:cSld>
+  <p:clrMapOvr>
+    <a:masterClrMapping/>
+  </p:clrMapOvr>
+</p:sld>
+</file>
+
+<file path=ppt/slides/slide4.xml><?xml version="1.0" encoding="utf-8"?>
+<p:sld xmlns:a="http://schemas.openxmlformats.org/drawingml/2006/main" xmlns:r="http://schemas.openxmlformats.org/officeDocument/2006/relationships" xmlns:p="http://schemas.openxmlformats.org/presentationml/2006/main">
+  <p:cSld>
+    <p:bg>
+      <p:bgPr>
+        <a:blipFill rotWithShape="0">
+          <a:blip r:embed="rId2"/>
+          <a:stretch/>
+        </a:blipFill>
+        <a:effectLst/>
+      </p:bgPr>
+    </p:bg>
+    <p:spTree>
+      <p:nvGrpSpPr>
+        <p:cNvPr id="1" name=""/>
+        <p:cNvGrpSpPr/>
+        <p:nvPr/>
+      </p:nvGrpSpPr>
+      <p:grpSpPr>
+        <a:xfrm>
+          <a:off x="0" y="0"/>
+          <a:ext cx="0" cy="0"/>
+          <a:chOff x="0" y="0"/>
+          <a:chExt cx="0" cy="0"/>
+        </a:xfrm>
+      </p:grpSpPr>
+      <p:sp>
+        <p:nvSpPr>
+          <p:cNvPr id="51" name="Google Shape;119;p6"/>
+          <p:cNvSpPr/>
+          <p:nvPr/>
+        </p:nvSpPr>
+        <p:spPr>
+          <a:xfrm>
+            <a:off x="456120" y="416520"/>
+            <a:ext cx="9815400" cy="741240"/>
+          </a:xfrm>
+          <a:prstGeom prst="rect">
+            <a:avLst/>
+          </a:prstGeom>
+          <a:noFill/>
+          <a:ln w="0">
+            <a:noFill/>
+          </a:ln>
+        </p:spPr>
+        <p:style>
+          <a:lnRef idx="0">
+            <a:scrgbClr r="0" g="0" b="0"/>
+          </a:lnRef>
+          <a:fillRef idx="0">
+            <a:scrgbClr r="0" g="0" b="0"/>
+          </a:fillRef>
+          <a:effectRef idx="0">
+            <a:scrgbClr r="0" g="0" b="0"/>
+          </a:effectRef>
+          <a:fontRef idx="minor"/>
+        </p:style>
+        <p:txBody>
+          <a:bodyPr anchor="t">
+            <a:noAutofit/>
+          </a:bodyPr>
+          <a:lstStyle/>
+          <a:p>
+            <a:pPr>
+              <a:lnSpc>
+                <a:spcPct val="90000"/>
+              </a:lnSpc>
+              <a:tabLst>
+                <a:tab pos="0" algn="l"/>
+              </a:tabLst>
+            </a:pPr>
+            <a:r>
+              <a:rPr lang="es-CO" sz="3600" b="1" strike="noStrike" spc="-1">
+                <a:solidFill>
+                  <a:srgbClr val="4D4D4C"/>
+                </a:solidFill>
+                <a:latin typeface="Work Sans"/>
+                <a:ea typeface="Work Sans"/>
+              </a:rPr>
+              <a:t>Metodología</a:t>
+            </a:r>
+            <a:endParaRPr lang="es-CO" sz="3600" b="0" strike="noStrike" spc="-1">
+              <a:solidFill>
+                <a:srgbClr val="000000"/>
+              </a:solidFill>
+              <a:latin typeface="Arial"/>
+            </a:endParaRPr>
+          </a:p>
+        </p:txBody>
+      </p:sp>
+      <p:sp>
+        <p:nvSpPr>
+          <p:cNvPr id="52" name="Google Shape;120;p6"/>
+          <p:cNvSpPr/>
+          <p:nvPr/>
+        </p:nvSpPr>
+        <p:spPr>
+          <a:xfrm>
+            <a:off x="456120" y="1297080"/>
+            <a:ext cx="6695682" cy="1938992"/>
+          </a:xfrm>
+          <a:prstGeom prst="rect">
+            <a:avLst/>
+          </a:prstGeom>
+          <a:noFill/>
+          <a:ln w="0">
+            <a:noFill/>
+          </a:ln>
+        </p:spPr>
+        <p:style>
+          <a:lnRef idx="0">
+            <a:scrgbClr r="0" g="0" b="0"/>
+          </a:lnRef>
+          <a:fillRef idx="0">
+            <a:scrgbClr r="0" g="0" b="0"/>
+          </a:fillRef>
+          <a:effectRef idx="0">
+            <a:scrgbClr r="0" g="0" b="0"/>
+          </a:effectRef>
+          <a:fontRef idx="minor"/>
+        </p:style>
+        <p:txBody>
+          <a:bodyPr wrap="square" anchor="t">
+            <a:spAutoFit/>
+          </a:bodyPr>
+          <a:lstStyle/>
+          <a:p>
+            <a:pPr algn="just">
+              <a:spcBef>
+                <a:spcPts val="1199"/>
+              </a:spcBef>
+              <a:tabLst>
+                <a:tab pos="0" algn="l"/>
+              </a:tabLst>
+            </a:pPr>
+            <a:r>
+              <a:rPr lang="es-MX" sz="1600" b="0" strike="noStrike" spc="-1" dirty="0">
+                <a:solidFill>
+                  <a:schemeClr val="dk1"/>
+                </a:solidFill>
+                <a:latin typeface="Work Sans Light"/>
+                <a:ea typeface="Work Sans Light"/>
+              </a:rPr>
+              <a:t>Este proyecto se enfocará en las 4 líneas vitales: </a:t>
+            </a:r>
+          </a:p>
+          <a:p>
+            <a:pPr marL="285750" indent="-285750" algn="just">
+              <a:spcBef>
+                <a:spcPts val="1199"/>
+              </a:spcBef>
+              <a:buFont typeface="Arial" panose="020B0604020202020204" pitchFamily="34" charset="0"/>
+              <a:buChar char="•"/>
+              <a:tabLst>
+                <a:tab pos="0" algn="l"/>
+              </a:tabLst>
+            </a:pPr>
+            <a:r>
+              <a:rPr lang="es-MX" sz="1600" b="0" strike="noStrike" spc="-1" dirty="0">
+                <a:solidFill>
+                  <a:schemeClr val="dk1"/>
+                </a:solidFill>
+                <a:latin typeface="Work Sans Light"/>
+                <a:ea typeface="Work Sans Light"/>
+              </a:rPr>
+              <a:t>Ciencias de la Atmósfera, </a:t>
+            </a:r>
+          </a:p>
+          <a:p>
+            <a:pPr marL="285750" indent="-285750" algn="just">
+              <a:spcBef>
+                <a:spcPts val="1199"/>
+              </a:spcBef>
+              <a:buFont typeface="Arial" panose="020B0604020202020204" pitchFamily="34" charset="0"/>
+              <a:buChar char="•"/>
+              <a:tabLst>
+                <a:tab pos="0" algn="l"/>
+              </a:tabLst>
+            </a:pPr>
+            <a:r>
+              <a:rPr lang="es-MX" sz="1600" b="0" strike="noStrike" spc="-1" dirty="0">
+                <a:solidFill>
+                  <a:schemeClr val="dk1"/>
+                </a:solidFill>
+                <a:latin typeface="Work Sans Light"/>
+                <a:ea typeface="Work Sans Light"/>
+              </a:rPr>
+              <a:t>Ciencia de Datos, </a:t>
+            </a:r>
+          </a:p>
+          <a:p>
+            <a:pPr marL="285750" indent="-285750" algn="just">
+              <a:spcBef>
+                <a:spcPts val="1199"/>
+              </a:spcBef>
+              <a:buFont typeface="Arial" panose="020B0604020202020204" pitchFamily="34" charset="0"/>
+              <a:buChar char="•"/>
+              <a:tabLst>
+                <a:tab pos="0" algn="l"/>
+              </a:tabLst>
+            </a:pPr>
+            <a:r>
+              <a:rPr lang="es-MX" sz="1600" b="0" strike="noStrike" spc="-1" dirty="0">
+                <a:solidFill>
+                  <a:schemeClr val="dk1"/>
+                </a:solidFill>
+                <a:latin typeface="Work Sans Light"/>
+                <a:ea typeface="Work Sans Light"/>
+              </a:rPr>
+              <a:t>Astronomía</a:t>
+            </a:r>
+          </a:p>
+          <a:p>
+            <a:pPr marL="285750" indent="-285750" algn="just">
+              <a:spcBef>
+                <a:spcPts val="1199"/>
+              </a:spcBef>
+              <a:buFont typeface="Arial" panose="020B0604020202020204" pitchFamily="34" charset="0"/>
+              <a:buChar char="•"/>
+              <a:tabLst>
+                <a:tab pos="0" algn="l"/>
+              </a:tabLst>
+            </a:pPr>
+            <a:r>
+              <a:rPr lang="es-MX" sz="1600" b="0" strike="noStrike" spc="-1" dirty="0">
+                <a:solidFill>
+                  <a:schemeClr val="dk1"/>
+                </a:solidFill>
+                <a:latin typeface="Work Sans Light"/>
+                <a:ea typeface="Work Sans Light"/>
+              </a:rPr>
+              <a:t>Apropiación Social del Conocimiento.</a:t>
+            </a:r>
+            <a:endParaRPr lang="es-CO" sz="1600" b="0" strike="noStrike" spc="-1" dirty="0">
+              <a:solidFill>
+                <a:srgbClr val="000000"/>
+              </a:solidFill>
+              <a:latin typeface="Arial"/>
+            </a:endParaRPr>
+          </a:p>
+        </p:txBody>
+      </p:sp>
+      <p:pic>
+        <p:nvPicPr>
+          <p:cNvPr id="11" name="Imagen 10">
+            <a:extLst>
+              <a:ext uri="{FF2B5EF4-FFF2-40B4-BE49-F238E27FC236}">
+                <a16:creationId xmlns:a16="http://schemas.microsoft.com/office/drawing/2014/main" id="{4EFC41B4-C0B4-6467-CC9A-86C0545028AE}"/>
+              </a:ext>
+            </a:extLst>
+          </p:cNvPr>
+          <p:cNvPicPr>
+            <a:picLocks noChangeAspect="1"/>
+          </p:cNvPicPr>
+          <p:nvPr/>
+        </p:nvPicPr>
+        <p:blipFill>
+          <a:blip r:embed="rId3"/>
+          <a:stretch>
+            <a:fillRect/>
+          </a:stretch>
+        </p:blipFill>
+        <p:spPr>
+          <a:xfrm>
+            <a:off x="6974421" y="416520"/>
+            <a:ext cx="1808480" cy="1808480"/>
+          </a:xfrm>
+          <a:prstGeom prst="rect">
+            <a:avLst/>
+          </a:prstGeom>
+        </p:spPr>
+      </p:pic>
+      <p:pic>
+        <p:nvPicPr>
+          <p:cNvPr id="15" name="Imagen 14">
+            <a:extLst>
+              <a:ext uri="{FF2B5EF4-FFF2-40B4-BE49-F238E27FC236}">
+                <a16:creationId xmlns:a16="http://schemas.microsoft.com/office/drawing/2014/main" id="{96E13AEA-6334-69FB-316F-3C2D82828AA3}"/>
+              </a:ext>
+            </a:extLst>
+          </p:cNvPr>
+          <p:cNvPicPr>
+            <a:picLocks noChangeAspect="1"/>
+          </p:cNvPicPr>
+          <p:nvPr/>
+        </p:nvPicPr>
+        <p:blipFill>
+          <a:blip r:embed="rId4"/>
+          <a:stretch>
+            <a:fillRect/>
+          </a:stretch>
+        </p:blipFill>
+        <p:spPr>
+          <a:xfrm>
+            <a:off x="8890000" y="2266576"/>
+            <a:ext cx="1938992" cy="1938992"/>
+          </a:xfrm>
+          <a:prstGeom prst="rect">
+            <a:avLst/>
+          </a:prstGeom>
+        </p:spPr>
+      </p:pic>
+      <p:pic>
+        <p:nvPicPr>
+          <p:cNvPr id="21" name="Imagen 20">
+            <a:extLst>
+              <a:ext uri="{FF2B5EF4-FFF2-40B4-BE49-F238E27FC236}">
+                <a16:creationId xmlns:a16="http://schemas.microsoft.com/office/drawing/2014/main" id="{3F012F5C-9AF5-38B6-81C1-AE1EFC9E8EA3}"/>
+              </a:ext>
+            </a:extLst>
+          </p:cNvPr>
+          <p:cNvPicPr>
+            <a:picLocks noChangeAspect="1"/>
+          </p:cNvPicPr>
+          <p:nvPr/>
+        </p:nvPicPr>
+        <p:blipFill>
+          <a:blip r:embed="rId5"/>
+          <a:stretch>
+            <a:fillRect/>
+          </a:stretch>
+        </p:blipFill>
+        <p:spPr>
+          <a:xfrm>
+            <a:off x="6458053" y="3621929"/>
+            <a:ext cx="2324848" cy="2324848"/>
+          </a:xfrm>
+          <a:prstGeom prst="rect">
+            <a:avLst/>
+          </a:prstGeom>
+        </p:spPr>
+      </p:pic>
+      <p:pic>
+        <p:nvPicPr>
+          <p:cNvPr id="23" name="Imagen 22">
+            <a:extLst>
+              <a:ext uri="{FF2B5EF4-FFF2-40B4-BE49-F238E27FC236}">
+                <a16:creationId xmlns:a16="http://schemas.microsoft.com/office/drawing/2014/main" id="{ECF6192C-94B9-9279-EAC6-DCAA7C28E5D6}"/>
+              </a:ext>
+            </a:extLst>
+          </p:cNvPr>
+          <p:cNvPicPr>
+            <a:picLocks noChangeAspect="1"/>
+          </p:cNvPicPr>
+          <p:nvPr/>
+        </p:nvPicPr>
+        <p:blipFill>
+          <a:blip r:embed="rId6"/>
+          <a:stretch>
+            <a:fillRect/>
+          </a:stretch>
+        </p:blipFill>
+        <p:spPr>
+          <a:xfrm>
+            <a:off x="2879941" y="3876040"/>
+            <a:ext cx="2438400" cy="2438400"/>
+          </a:xfrm>
+          <a:prstGeom prst="rect">
+            <a:avLst/>
+          </a:prstGeom>
+        </p:spPr>
+      </p:pic>
     </p:spTree>
   </p:cSld>
   <p:clrMapOvr>
@@ -5716,14 +5698,14 @@
       </p:grpSpPr>
       <p:sp>
         <p:nvSpPr>
-          <p:cNvPr id="51" name="Google Shape;119;p6"/>
+          <p:cNvPr id="54" name="Google Shape;126;p7"/>
           <p:cNvSpPr/>
           <p:nvPr/>
         </p:nvSpPr>
         <p:spPr>
           <a:xfrm>
-            <a:off x="456120" y="416520"/>
-            <a:ext cx="9815400" cy="741240"/>
+            <a:off x="317160" y="416520"/>
+            <a:ext cx="9815400" cy="527760"/>
           </a:xfrm>
           <a:prstGeom prst="rect">
             <a:avLst/>
@@ -5762,12 +5744,12 @@
             <a:r>
               <a:rPr lang="es-CO" sz="3600" b="1" strike="noStrike" spc="-1">
                 <a:solidFill>
-                  <a:srgbClr val="4D4D4C"/>
+                  <a:srgbClr val="FFFFFF"/>
                 </a:solidFill>
                 <a:latin typeface="Work Sans"/>
                 <a:ea typeface="Work Sans"/>
               </a:rPr>
-              <a:t>Metodología</a:t>
+              <a:t>Resultados</a:t>
             </a:r>
             <a:endParaRPr lang="es-CO" sz="3600" b="0" strike="noStrike" spc="-1">
               <a:solidFill>
@@ -5780,14 +5762,14 @@
       </p:sp>
       <p:sp>
         <p:nvSpPr>
-          <p:cNvPr id="52" name="Google Shape;120;p6"/>
+          <p:cNvPr id="55" name="Google Shape;127;p7"/>
           <p:cNvSpPr/>
           <p:nvPr/>
         </p:nvSpPr>
         <p:spPr>
           <a:xfrm>
-            <a:off x="456120" y="1297080"/>
-            <a:ext cx="10835280" cy="1583280"/>
+            <a:off x="376200" y="1544400"/>
+            <a:ext cx="10835280" cy="2266133"/>
           </a:xfrm>
           <a:prstGeom prst="rect">
             <a:avLst/>
@@ -5822,19 +5804,22 @@
               <a:spcBef>
                 <a:spcPts val="1199"/>
               </a:spcBef>
+              <a:spcAft>
+                <a:spcPts val="1199"/>
+              </a:spcAft>
               <a:tabLst>
                 <a:tab pos="0" algn="l"/>
               </a:tabLst>
             </a:pPr>
             <a:r>
-              <a:rPr lang="es-CO" sz="1600" b="0" strike="noStrike" spc="-1" dirty="0">
+              <a:rPr lang="es-MX" sz="1600" b="0" strike="noStrike" spc="-1">
                 <a:solidFill>
                   <a:schemeClr val="dk1"/>
                 </a:solidFill>
                 <a:latin typeface="Work Sans Light"/>
                 <a:ea typeface="Work Sans Light"/>
               </a:rPr>
-              <a:t>En este apartado definir la naturaleza de la investigación, al igual que los participantes, materiales, instrumentos y procedimientos llevados a cabo para el correcto desarrollo del acercamiento investigativo. </a:t>
+              <a:t>Herramientas para la presentación de los datos. Dada la cantidad de datos que se obtendrán durante el tiempo del proyecto (y proyectado a futuro) se espera crear un conjunto de herramientas (programas en lenguaje PYTHON y SQL) para el monitoreo de variables y almacenamiento de datos para diferentes estudios en una página web en un servidor de la Universidad, controlado y administrado desde el LUCA. Un ejemplo puede observarse en la página creada para la presentación de los datos de las 8 estaciones: http://54.146.188.73:8501</a:t>
             </a:r>
             <a:endParaRPr lang="es-CO" sz="1600" b="0" strike="noStrike" spc="-1" dirty="0">
               <a:solidFill>
@@ -5843,27 +5828,38 @@
               <a:latin typeface="Arial"/>
             </a:endParaRPr>
           </a:p>
-          <a:p>
-            <a:pPr marL="457200">
-              <a:lnSpc>
-                <a:spcPct val="100000"/>
-              </a:lnSpc>
-              <a:spcBef>
-                <a:spcPts val="1199"/>
-              </a:spcBef>
-              <a:tabLst>
-                <a:tab pos="0" algn="l"/>
-              </a:tabLst>
-            </a:pPr>
-            <a:endParaRPr lang="es-CO" sz="1600" b="0" strike="noStrike" spc="-1" dirty="0">
-              <a:solidFill>
-                <a:srgbClr val="000000"/>
-              </a:solidFill>
-              <a:latin typeface="Arial"/>
-            </a:endParaRPr>
-          </a:p>
-        </p:txBody>
-      </p:sp>
+        </p:txBody>
+      </p:sp>
+      <p:pic>
+        <p:nvPicPr>
+          <p:cNvPr id="3" name="Imagen 2">
+            <a:extLst>
+              <a:ext uri="{FF2B5EF4-FFF2-40B4-BE49-F238E27FC236}">
+                <a16:creationId xmlns:a16="http://schemas.microsoft.com/office/drawing/2014/main" id="{68EBDD84-043F-4E46-7738-441452676492}"/>
+              </a:ext>
+            </a:extLst>
+          </p:cNvPr>
+          <p:cNvPicPr>
+            <a:picLocks noChangeAspect="1"/>
+          </p:cNvPicPr>
+          <p:nvPr/>
+        </p:nvPicPr>
+        <p:blipFill>
+          <a:blip r:embed="rId3"/>
+          <a:stretch>
+            <a:fillRect/>
+          </a:stretch>
+        </p:blipFill>
+        <p:spPr>
+          <a:xfrm>
+            <a:off x="7879404" y="3914690"/>
+            <a:ext cx="2472447" cy="2472447"/>
+          </a:xfrm>
+          <a:prstGeom prst="rect">
+            <a:avLst/>
+          </a:prstGeom>
+        </p:spPr>
+      </p:pic>
     </p:spTree>
   </p:cSld>
   <p:clrMapOvr>
@@ -5898,39 +5894,16 @@
           <a:chExt cx="0" cy="0"/>
         </a:xfrm>
       </p:grpSpPr>
-      <p:pic>
-        <p:nvPicPr>
-          <p:cNvPr id="53" name="Google Shape;125;p7"/>
-          <p:cNvPicPr/>
-          <p:nvPr/>
-        </p:nvPicPr>
-        <p:blipFill>
-          <a:blip r:embed="rId3"/>
-          <a:stretch/>
-        </p:blipFill>
-        <p:spPr>
-          <a:xfrm>
-            <a:off x="376200" y="2505600"/>
-            <a:ext cx="7772040" cy="3490920"/>
-          </a:xfrm>
-          <a:prstGeom prst="rect">
-            <a:avLst/>
-          </a:prstGeom>
-          <a:ln w="0">
-            <a:noFill/>
-          </a:ln>
-        </p:spPr>
-      </p:pic>
-      <p:sp>
-        <p:nvSpPr>
-          <p:cNvPr id="54" name="Google Shape;126;p7"/>
+      <p:sp>
+        <p:nvSpPr>
+          <p:cNvPr id="58" name="Google Shape;138;g2808396b2cb_0_26"/>
           <p:cNvSpPr/>
           <p:nvPr/>
         </p:nvSpPr>
         <p:spPr>
           <a:xfrm>
-            <a:off x="317160" y="416520"/>
-            <a:ext cx="9815400" cy="527760"/>
+            <a:off x="444240" y="416880"/>
+            <a:ext cx="2886840" cy="1188360"/>
           </a:xfrm>
           <a:prstGeom prst="rect">
             <a:avLst/>
@@ -5954,13 +5927,13 @@
         </p:style>
         <p:txBody>
           <a:bodyPr anchor="t">
-            <a:noAutofit/>
+            <a:spAutoFit/>
           </a:bodyPr>
           <a:lstStyle/>
           <a:p>
-            <a:pPr>
+            <a:pPr algn="ctr">
               <a:lnSpc>
-                <a:spcPct val="90000"/>
+                <a:spcPct val="100000"/>
               </a:lnSpc>
               <a:tabLst>
                 <a:tab pos="0" algn="l"/>
@@ -5969,12 +5942,12 @@
             <a:r>
               <a:rPr lang="es-CO" sz="3600" b="1" strike="noStrike" spc="-1">
                 <a:solidFill>
-                  <a:srgbClr val="FFFFFF"/>
+                  <a:srgbClr val="4D4D4C"/>
                 </a:solidFill>
                 <a:latin typeface="Work Sans"/>
                 <a:ea typeface="Work Sans"/>
               </a:rPr>
-              <a:t>Resultados</a:t>
+              <a:t>Referencias</a:t>
             </a:r>
             <a:endParaRPr lang="es-CO" sz="3600" b="0" strike="noStrike" spc="-1">
               <a:solidFill>
@@ -5987,14 +5960,14 @@
       </p:sp>
       <p:sp>
         <p:nvSpPr>
-          <p:cNvPr id="55" name="Google Shape;127;p7"/>
+          <p:cNvPr id="59" name="Google Shape;139;g2808396b2cb_0_26"/>
           <p:cNvSpPr/>
           <p:nvPr/>
         </p:nvSpPr>
         <p:spPr>
           <a:xfrm>
-            <a:off x="376200" y="1544400"/>
-            <a:ext cx="10835280" cy="821880"/>
+            <a:off x="444240" y="1254600"/>
+            <a:ext cx="10835280" cy="1498936"/>
           </a:xfrm>
           <a:prstGeom prst="rect">
             <a:avLst/>
@@ -6022,31 +5995,130 @@
           </a:bodyPr>
           <a:lstStyle/>
           <a:p>
-            <a:pPr>
+            <a:pPr marL="285750" indent="-285750">
               <a:lnSpc>
                 <a:spcPct val="150000"/>
               </a:lnSpc>
               <a:spcBef>
                 <a:spcPts val="1199"/>
               </a:spcBef>
-              <a:spcAft>
-                <a:spcPts val="1199"/>
-              </a:spcAft>
+              <a:buFont typeface="Arial" panose="020B0604020202020204" pitchFamily="34" charset="0"/>
+              <a:buChar char="•"/>
               <a:tabLst>
                 <a:tab pos="0" algn="l"/>
               </a:tabLst>
             </a:pPr>
             <a:r>
-              <a:rPr lang="es-CO" sz="1600" b="0" strike="noStrike" spc="-1" dirty="0">
+              <a:rPr lang="en-US" sz="1400" b="0" strike="noStrike" spc="-1" dirty="0">
                 <a:solidFill>
                   <a:schemeClr val="dk1"/>
                 </a:solidFill>
-                <a:latin typeface="Work Sans Light"/>
-                <a:ea typeface="Work Sans Light"/>
+                <a:latin typeface="Arial"/>
+                <a:ea typeface="Arial"/>
               </a:rPr>
-              <a:t>En este apartado evidenciar y analizar los hallazgos obtenidos en el proceso de investigación mencionados en la metodología, respondiendo a la pregunta y objeto de estudio.</a:t>
-            </a:r>
-            <a:endParaRPr lang="es-CO" sz="1600" b="0" strike="noStrike" spc="-1" dirty="0">
+              <a:t>Arbeláez-Cardona, D., et al. "Estimating the number of clear sky </a:t>
+            </a:r>
+            <a:r>
+              <a:rPr lang="en-US" sz="1400" b="0" strike="noStrike" spc="-1" dirty="0" err="1">
+                <a:solidFill>
+                  <a:schemeClr val="dk1"/>
+                </a:solidFill>
+                <a:latin typeface="Arial"/>
+                <a:ea typeface="Arial"/>
+              </a:rPr>
+              <a:t>nightsusing</a:t>
+            </a:r>
+            <a:r>
+              <a:rPr lang="en-US" sz="1400" b="0" strike="noStrike" spc="-1" dirty="0">
+                <a:solidFill>
+                  <a:schemeClr val="dk1"/>
+                </a:solidFill>
+                <a:latin typeface="Arial"/>
+                <a:ea typeface="Arial"/>
+              </a:rPr>
+              <a:t> GOES-16 images: a search for astronomical sites in </a:t>
+            </a:r>
+            <a:r>
+              <a:rPr lang="en-US" sz="1400" b="0" strike="noStrike" spc="-1" dirty="0" err="1">
+                <a:solidFill>
+                  <a:schemeClr val="dk1"/>
+                </a:solidFill>
+                <a:latin typeface="Arial"/>
+                <a:ea typeface="Arial"/>
+              </a:rPr>
+              <a:t>Colombia."International</a:t>
+            </a:r>
+            <a:r>
+              <a:rPr lang="en-US" sz="1400" b="0" strike="noStrike" spc="-1" dirty="0">
+                <a:solidFill>
+                  <a:schemeClr val="dk1"/>
+                </a:solidFill>
+                <a:latin typeface="Arial"/>
+                <a:ea typeface="Arial"/>
+              </a:rPr>
+              <a:t> Journal of Remote Sensing 41.14 (2020): 5103-5126.https://doi.org/10.1080/01431161.2020.1727051</a:t>
+            </a:r>
+          </a:p>
+          <a:p>
+            <a:pPr marL="285750" indent="-285750">
+              <a:lnSpc>
+                <a:spcPct val="150000"/>
+              </a:lnSpc>
+              <a:spcBef>
+                <a:spcPts val="1199"/>
+              </a:spcBef>
+              <a:buFont typeface="Arial" panose="020B0604020202020204" pitchFamily="34" charset="0"/>
+              <a:buChar char="•"/>
+              <a:tabLst>
+                <a:tab pos="0" algn="l"/>
+              </a:tabLst>
+            </a:pPr>
+            <a:r>
+              <a:rPr lang="es-MX" sz="1400" b="0" strike="noStrike" spc="-1" dirty="0">
+                <a:solidFill>
+                  <a:srgbClr val="000000"/>
+                </a:solidFill>
+                <a:latin typeface="Arial"/>
+              </a:rPr>
+              <a:t>Vásquez, D. 2019. Procesamiento de datos meteorológicos del IDEAM con Python y validación de datos del reanálisis ERA5. Trabajo </a:t>
+            </a:r>
+            <a:r>
+              <a:rPr lang="es-MX" sz="1400" b="0" strike="noStrike" spc="-1" dirty="0" err="1">
+                <a:solidFill>
+                  <a:srgbClr val="000000"/>
+                </a:solidFill>
+                <a:latin typeface="Arial"/>
+              </a:rPr>
+              <a:t>deGrado</a:t>
+            </a:r>
+            <a:r>
+              <a:rPr lang="es-MX" sz="1400" b="0" strike="noStrike" spc="-1" dirty="0">
+                <a:solidFill>
+                  <a:srgbClr val="000000"/>
+                </a:solidFill>
+                <a:latin typeface="Arial"/>
+              </a:rPr>
+              <a:t> Ingeniería Ambiental. Escuela Ambiental. Universidad de </a:t>
+            </a:r>
+            <a:r>
+              <a:rPr lang="es-MX" sz="1400" b="0" strike="noStrike" spc="-1" dirty="0" err="1">
+                <a:solidFill>
+                  <a:srgbClr val="000000"/>
+                </a:solidFill>
+                <a:latin typeface="Arial"/>
+              </a:rPr>
+              <a:t>Antioqui</a:t>
+            </a:r>
+            <a:r>
+              <a:rPr lang="en-US" sz="1400" spc="-1" dirty="0">
+                <a:solidFill>
+                  <a:schemeClr val="dk1"/>
+                </a:solidFill>
+                <a:latin typeface="Arial"/>
+              </a:rPr>
+              <a:t>a</a:t>
+            </a:r>
+            <a:endParaRPr lang="es-CO" sz="1400" b="0" strike="noStrike" spc="-1" dirty="0">
               <a:solidFill>
                 <a:srgbClr val="000000"/>
               </a:solidFill>
@@ -6064,385 +6136,6 @@
 </file>
 
 <file path=ppt/slides/slide7.xml><?xml version="1.0" encoding="utf-8"?>
-<p:sld xmlns:a="http://schemas.openxmlformats.org/drawingml/2006/main" xmlns:r="http://schemas.openxmlformats.org/officeDocument/2006/relationships" xmlns:p="http://schemas.openxmlformats.org/presentationml/2006/main">
-  <p:cSld>
-    <p:bg>
-      <p:bgPr>
-        <a:blipFill rotWithShape="0">
-          <a:blip r:embed="rId2"/>
-          <a:stretch/>
-        </a:blipFill>
-        <a:effectLst/>
-      </p:bgPr>
-    </p:bg>
-    <p:spTree>
-      <p:nvGrpSpPr>
-        <p:cNvPr id="1" name=""/>
-        <p:cNvGrpSpPr/>
-        <p:nvPr/>
-      </p:nvGrpSpPr>
-      <p:grpSpPr>
-        <a:xfrm>
-          <a:off x="0" y="0"/>
-          <a:ext cx="0" cy="0"/>
-          <a:chOff x="0" y="0"/>
-          <a:chExt cx="0" cy="0"/>
-        </a:xfrm>
-      </p:grpSpPr>
-      <p:sp>
-        <p:nvSpPr>
-          <p:cNvPr id="56" name="Google Shape;132;g2808396b2cb_0_11"/>
-          <p:cNvSpPr/>
-          <p:nvPr/>
-        </p:nvSpPr>
-        <p:spPr>
-          <a:xfrm>
-            <a:off x="317160" y="416520"/>
-            <a:ext cx="9815400" cy="527760"/>
-          </a:xfrm>
-          <a:prstGeom prst="rect">
-            <a:avLst/>
-          </a:prstGeom>
-          <a:noFill/>
-          <a:ln w="0">
-            <a:noFill/>
-          </a:ln>
-        </p:spPr>
-        <p:style>
-          <a:lnRef idx="0">
-            <a:scrgbClr r="0" g="0" b="0"/>
-          </a:lnRef>
-          <a:fillRef idx="0">
-            <a:scrgbClr r="0" g="0" b="0"/>
-          </a:fillRef>
-          <a:effectRef idx="0">
-            <a:scrgbClr r="0" g="0" b="0"/>
-          </a:effectRef>
-          <a:fontRef idx="minor"/>
-        </p:style>
-        <p:txBody>
-          <a:bodyPr anchor="t">
-            <a:noAutofit/>
-          </a:bodyPr>
-          <a:lstStyle/>
-          <a:p>
-            <a:pPr>
-              <a:lnSpc>
-                <a:spcPct val="90000"/>
-              </a:lnSpc>
-              <a:tabLst>
-                <a:tab pos="0" algn="l"/>
-              </a:tabLst>
-            </a:pPr>
-            <a:r>
-              <a:rPr lang="es-CO" sz="3600" b="1" strike="noStrike" spc="-1">
-                <a:solidFill>
-                  <a:srgbClr val="FFFFFF"/>
-                </a:solidFill>
-                <a:latin typeface="Work Sans"/>
-                <a:ea typeface="Work Sans"/>
-              </a:rPr>
-              <a:t>Conclusiones</a:t>
-            </a:r>
-            <a:endParaRPr lang="es-CO" sz="3600" b="0" strike="noStrike" spc="-1">
-              <a:solidFill>
-                <a:srgbClr val="000000"/>
-              </a:solidFill>
-              <a:latin typeface="Arial"/>
-            </a:endParaRPr>
-          </a:p>
-        </p:txBody>
-      </p:sp>
-      <p:sp>
-        <p:nvSpPr>
-          <p:cNvPr id="57" name="Google Shape;133;g2808396b2cb_0_11"/>
-          <p:cNvSpPr/>
-          <p:nvPr/>
-        </p:nvSpPr>
-        <p:spPr>
-          <a:xfrm>
-            <a:off x="376200" y="1544400"/>
-            <a:ext cx="10835280" cy="731160"/>
-          </a:xfrm>
-          <a:prstGeom prst="rect">
-            <a:avLst/>
-          </a:prstGeom>
-          <a:noFill/>
-          <a:ln w="0">
-            <a:noFill/>
-          </a:ln>
-        </p:spPr>
-        <p:style>
-          <a:lnRef idx="0">
-            <a:scrgbClr r="0" g="0" b="0"/>
-          </a:lnRef>
-          <a:fillRef idx="0">
-            <a:scrgbClr r="0" g="0" b="0"/>
-          </a:fillRef>
-          <a:effectRef idx="0">
-            <a:scrgbClr r="0" g="0" b="0"/>
-          </a:effectRef>
-          <a:fontRef idx="minor"/>
-        </p:style>
-        <p:txBody>
-          <a:bodyPr anchor="t">
-            <a:spAutoFit/>
-          </a:bodyPr>
-          <a:lstStyle/>
-          <a:p>
-            <a:pPr>
-              <a:lnSpc>
-                <a:spcPct val="150000"/>
-              </a:lnSpc>
-              <a:spcBef>
-                <a:spcPts val="1199"/>
-              </a:spcBef>
-              <a:spcAft>
-                <a:spcPts val="1199"/>
-              </a:spcAft>
-              <a:tabLst>
-                <a:tab pos="0" algn="l"/>
-              </a:tabLst>
-            </a:pPr>
-            <a:r>
-              <a:rPr lang="es-CO" sz="1400" b="0" strike="noStrike" spc="-1">
-                <a:solidFill>
-                  <a:schemeClr val="dk1"/>
-                </a:solidFill>
-                <a:latin typeface="Arial"/>
-                <a:ea typeface="Arial"/>
-              </a:rPr>
-              <a:t>En este apartado, desarrollar un análisis conclusivo del proceso de investigación desde sus logros, alcances y limitaciones, frente al cumplimiento del objetivo de estudio. A su vez mencionar las recomendaciones para futuros planes investigativos. </a:t>
-            </a:r>
-            <a:endParaRPr lang="es-CO" sz="1400" b="0" strike="noStrike" spc="-1">
-              <a:solidFill>
-                <a:srgbClr val="000000"/>
-              </a:solidFill>
-              <a:latin typeface="Arial"/>
-            </a:endParaRPr>
-          </a:p>
-        </p:txBody>
-      </p:sp>
-    </p:spTree>
-  </p:cSld>
-  <p:clrMapOvr>
-    <a:masterClrMapping/>
-  </p:clrMapOvr>
-</p:sld>
-</file>
-
-<file path=ppt/slides/slide8.xml><?xml version="1.0" encoding="utf-8"?>
-<p:sld xmlns:a="http://schemas.openxmlformats.org/drawingml/2006/main" xmlns:r="http://schemas.openxmlformats.org/officeDocument/2006/relationships" xmlns:p="http://schemas.openxmlformats.org/presentationml/2006/main">
-  <p:cSld>
-    <p:bg>
-      <p:bgPr>
-        <a:blipFill rotWithShape="0">
-          <a:blip r:embed="rId2"/>
-          <a:stretch/>
-        </a:blipFill>
-        <a:effectLst/>
-      </p:bgPr>
-    </p:bg>
-    <p:spTree>
-      <p:nvGrpSpPr>
-        <p:cNvPr id="1" name=""/>
-        <p:cNvGrpSpPr/>
-        <p:nvPr/>
-      </p:nvGrpSpPr>
-      <p:grpSpPr>
-        <a:xfrm>
-          <a:off x="0" y="0"/>
-          <a:ext cx="0" cy="0"/>
-          <a:chOff x="0" y="0"/>
-          <a:chExt cx="0" cy="0"/>
-        </a:xfrm>
-      </p:grpSpPr>
-      <p:sp>
-        <p:nvSpPr>
-          <p:cNvPr id="58" name="Google Shape;138;g2808396b2cb_0_26"/>
-          <p:cNvSpPr/>
-          <p:nvPr/>
-        </p:nvSpPr>
-        <p:spPr>
-          <a:xfrm>
-            <a:off x="444240" y="416880"/>
-            <a:ext cx="2886840" cy="1188360"/>
-          </a:xfrm>
-          <a:prstGeom prst="rect">
-            <a:avLst/>
-          </a:prstGeom>
-          <a:noFill/>
-          <a:ln w="0">
-            <a:noFill/>
-          </a:ln>
-        </p:spPr>
-        <p:style>
-          <a:lnRef idx="0">
-            <a:scrgbClr r="0" g="0" b="0"/>
-          </a:lnRef>
-          <a:fillRef idx="0">
-            <a:scrgbClr r="0" g="0" b="0"/>
-          </a:fillRef>
-          <a:effectRef idx="0">
-            <a:scrgbClr r="0" g="0" b="0"/>
-          </a:effectRef>
-          <a:fontRef idx="minor"/>
-        </p:style>
-        <p:txBody>
-          <a:bodyPr anchor="t">
-            <a:spAutoFit/>
-          </a:bodyPr>
-          <a:lstStyle/>
-          <a:p>
-            <a:pPr algn="ctr">
-              <a:lnSpc>
-                <a:spcPct val="100000"/>
-              </a:lnSpc>
-              <a:tabLst>
-                <a:tab pos="0" algn="l"/>
-              </a:tabLst>
-            </a:pPr>
-            <a:r>
-              <a:rPr lang="es-CO" sz="3600" b="1" strike="noStrike" spc="-1">
-                <a:solidFill>
-                  <a:srgbClr val="4D4D4C"/>
-                </a:solidFill>
-                <a:latin typeface="Work Sans"/>
-                <a:ea typeface="Work Sans"/>
-              </a:rPr>
-              <a:t>Referencias</a:t>
-            </a:r>
-            <a:endParaRPr lang="es-CO" sz="3600" b="0" strike="noStrike" spc="-1">
-              <a:solidFill>
-                <a:srgbClr val="000000"/>
-              </a:solidFill>
-              <a:latin typeface="Arial"/>
-            </a:endParaRPr>
-          </a:p>
-        </p:txBody>
-      </p:sp>
-      <p:sp>
-        <p:nvSpPr>
-          <p:cNvPr id="59" name="Google Shape;139;g2808396b2cb_0_26"/>
-          <p:cNvSpPr/>
-          <p:nvPr/>
-        </p:nvSpPr>
-        <p:spPr>
-          <a:xfrm>
-            <a:off x="444240" y="1254600"/>
-            <a:ext cx="10835280" cy="883440"/>
-          </a:xfrm>
-          <a:prstGeom prst="rect">
-            <a:avLst/>
-          </a:prstGeom>
-          <a:noFill/>
-          <a:ln w="0">
-            <a:noFill/>
-          </a:ln>
-        </p:spPr>
-        <p:style>
-          <a:lnRef idx="0">
-            <a:scrgbClr r="0" g="0" b="0"/>
-          </a:lnRef>
-          <a:fillRef idx="0">
-            <a:scrgbClr r="0" g="0" b="0"/>
-          </a:fillRef>
-          <a:effectRef idx="0">
-            <a:scrgbClr r="0" g="0" b="0"/>
-          </a:effectRef>
-          <a:fontRef idx="minor"/>
-        </p:style>
-        <p:txBody>
-          <a:bodyPr anchor="t">
-            <a:spAutoFit/>
-          </a:bodyPr>
-          <a:lstStyle/>
-          <a:p>
-            <a:pPr>
-              <a:lnSpc>
-                <a:spcPct val="150000"/>
-              </a:lnSpc>
-              <a:spcBef>
-                <a:spcPts val="1199"/>
-              </a:spcBef>
-              <a:tabLst>
-                <a:tab pos="0" algn="l"/>
-              </a:tabLst>
-            </a:pPr>
-            <a:r>
-              <a:rPr lang="es-CO" sz="1400" b="0" strike="noStrike" spc="-1">
-                <a:solidFill>
-                  <a:schemeClr val="dk1"/>
-                </a:solidFill>
-                <a:latin typeface="Arial"/>
-                <a:ea typeface="Arial"/>
-              </a:rPr>
-              <a:t>Usar norma APA última edición:</a:t>
-            </a:r>
-            <a:r>
-              <a:rPr lang="es-CO" sz="1400" b="0" u="sng" strike="noStrike" spc="-1">
-                <a:solidFill>
-                  <a:schemeClr val="dk1"/>
-                </a:solidFill>
-                <a:uFillTx/>
-                <a:latin typeface="Arial"/>
-                <a:ea typeface="Arial"/>
-                <a:hlinkClick r:id="rId3"/>
-              </a:rPr>
-              <a:t> </a:t>
-            </a:r>
-            <a:r>
-              <a:rPr lang="es-CO" sz="1400" b="0" u="sng" strike="noStrike" spc="-1">
-                <a:solidFill>
-                  <a:schemeClr val="hlink"/>
-                </a:solidFill>
-                <a:uFillTx/>
-                <a:latin typeface="Arial"/>
-                <a:ea typeface="Arial"/>
-                <a:hlinkClick r:id="rId3"/>
-              </a:rPr>
-              <a:t>https://normas-apa.org/wp-content/uploads/Guia-Normas-APA-7ma-edicion.pdf</a:t>
-            </a:r>
-            <a:endParaRPr lang="es-CO" sz="1400" b="0" strike="noStrike" spc="-1">
-              <a:solidFill>
-                <a:srgbClr val="000000"/>
-              </a:solidFill>
-              <a:latin typeface="Arial"/>
-            </a:endParaRPr>
-          </a:p>
-          <a:p>
-            <a:pPr>
-              <a:lnSpc>
-                <a:spcPct val="150000"/>
-              </a:lnSpc>
-              <a:spcBef>
-                <a:spcPts val="1199"/>
-              </a:spcBef>
-              <a:spcAft>
-                <a:spcPts val="1199"/>
-              </a:spcAft>
-              <a:tabLst>
-                <a:tab pos="0" algn="l"/>
-              </a:tabLst>
-            </a:pPr>
-            <a:endParaRPr lang="es-CO" sz="1400" b="0" strike="noStrike" spc="-1">
-              <a:solidFill>
-                <a:srgbClr val="000000"/>
-              </a:solidFill>
-              <a:latin typeface="Arial"/>
-            </a:endParaRPr>
-          </a:p>
-        </p:txBody>
-      </p:sp>
-    </p:spTree>
-  </p:cSld>
-  <p:clrMapOvr>
-    <a:masterClrMapping/>
-  </p:clrMapOvr>
-</p:sld>
-</file>
-
-<file path=ppt/slides/slide9.xml><?xml version="1.0" encoding="utf-8"?>
 <p:sld xmlns:a="http://schemas.openxmlformats.org/drawingml/2006/main" xmlns:r="http://schemas.openxmlformats.org/officeDocument/2006/relationships" xmlns:p="http://schemas.openxmlformats.org/presentationml/2006/main">
   <p:cSld>
     <p:bg>

</xml_diff>